<commit_message>
moved sht around and formatted figure names etc
</commit_message>
<xml_diff>
--- a/poster/poster_ac221.pptx
+++ b/poster/poster_ac221.pptx
@@ -7949,7 +7949,7 @@
             <a:avLst/>
           </a:prstGeom>
           <a:solidFill>
-            <a:srgbClr val="00AAAD"/>
+            <a:srgbClr val="1A8C8C"/>
           </a:solidFill>
           <a:ln w="76200" cap="flat">
             <a:noFill/>
@@ -8255,8 +8255,8 @@
         </p:nvSpPr>
         <p:spPr>
           <a:xfrm>
-            <a:off x="731837" y="5484849"/>
-            <a:ext cx="13845581" cy="16290629"/>
+            <a:off x="731837" y="5484850"/>
+            <a:ext cx="13845581" cy="15379686"/>
           </a:xfrm>
           <a:prstGeom prst="rect">
             <a:avLst/>
@@ -8273,7 +8273,7 @@
           </a:ln>
         </p:spPr>
         <p:txBody>
-          <a:bodyPr wrap="square" rtlCol="0" anchor="t">
+          <a:bodyPr wrap="square" lIns="457200" tIns="274320" rIns="457200" bIns="274320" rtlCol="0" anchor="t">
             <a:noAutofit/>
           </a:bodyPr>
           <a:lstStyle/>
@@ -8396,7 +8396,7 @@
                 <a:ea typeface="Verdana" panose="020B0604030504040204" pitchFamily="34" charset="0"/>
                 <a:cs typeface="Baghdad" pitchFamily="2" charset="-78"/>
               </a:rPr>
-              <a:t>We modeled the assignment of violence decile scores using individuals’ age, sex, race, priors and misdemeanor counts. We utilized three classifiers and report results for the Decision Tree classifier.</a:t>
+              <a:t>We modeled the assignment of violence decile scores using individuals’ age, sex, race, priors and misdemeanor counts. We trained three classifiers and report on the Decision Tree.</a:t>
             </a:r>
           </a:p>
         </p:txBody>
@@ -8415,8 +8415,8 @@
         </p:nvGrpSpPr>
         <p:grpSpPr>
           <a:xfrm>
-            <a:off x="1151166" y="1872542"/>
-            <a:ext cx="3090250" cy="2114359"/>
+            <a:off x="1151166" y="2550051"/>
+            <a:ext cx="2100034" cy="1436850"/>
             <a:chOff x="628650" y="1872542"/>
             <a:chExt cx="3090250" cy="2114359"/>
           </a:xfrm>
@@ -8494,7 +8494,7 @@
         </p:nvSpPr>
         <p:spPr>
           <a:xfrm>
-            <a:off x="15022810" y="5484851"/>
+            <a:off x="15022810" y="5506623"/>
             <a:ext cx="13845581" cy="26919953"/>
           </a:xfrm>
           <a:prstGeom prst="rect">
@@ -8516,105 +8516,6 @@
             <a:noAutofit/>
           </a:bodyPr>
           <a:lstStyle/>
-          <a:p>
-            <a:pPr lvl="0" algn="ctr">
-              <a:spcBef>
-                <a:spcPts val="600"/>
-              </a:spcBef>
-            </a:pPr>
-            <a:r>
-              <a:rPr lang="en-US" sz="4400" dirty="0">
-                <a:latin typeface="Avenir Roman" panose="02000503020000020003" pitchFamily="2" charset="0"/>
-                <a:ea typeface="Verdana" panose="020B0604030504040204" pitchFamily="34" charset="0"/>
-                <a:cs typeface="Baghdad" pitchFamily="2" charset="-78"/>
-              </a:rPr>
-              <a:t>--</a:t>
-            </a:r>
-          </a:p>
-          <a:p>
-            <a:pPr lvl="0" algn="ctr">
-              <a:spcBef>
-                <a:spcPts val="600"/>
-              </a:spcBef>
-            </a:pPr>
-            <a:endParaRPr lang="en-US" sz="4400" dirty="0">
-              <a:latin typeface="Avenir Roman" panose="02000503020000020003" pitchFamily="2" charset="0"/>
-              <a:ea typeface="Verdana" panose="020B0604030504040204" pitchFamily="34" charset="0"/>
-              <a:cs typeface="Baghdad" pitchFamily="2" charset="-78"/>
-            </a:endParaRPr>
-          </a:p>
-          <a:p>
-            <a:pPr lvl="0" algn="ctr">
-              <a:spcBef>
-                <a:spcPts val="600"/>
-              </a:spcBef>
-            </a:pPr>
-            <a:endParaRPr lang="en-US" sz="4400" dirty="0">
-              <a:latin typeface="Avenir Roman" panose="02000503020000020003" pitchFamily="2" charset="0"/>
-              <a:ea typeface="Verdana" panose="020B0604030504040204" pitchFamily="34" charset="0"/>
-              <a:cs typeface="Baghdad" pitchFamily="2" charset="-78"/>
-            </a:endParaRPr>
-          </a:p>
-          <a:p>
-            <a:pPr lvl="0" algn="ctr">
-              <a:spcBef>
-                <a:spcPts val="600"/>
-              </a:spcBef>
-            </a:pPr>
-            <a:endParaRPr lang="en-US" sz="4400" dirty="0">
-              <a:latin typeface="Avenir Roman" panose="02000503020000020003" pitchFamily="2" charset="0"/>
-              <a:ea typeface="Verdana" panose="020B0604030504040204" pitchFamily="34" charset="0"/>
-              <a:cs typeface="Baghdad" pitchFamily="2" charset="-78"/>
-            </a:endParaRPr>
-          </a:p>
-          <a:p>
-            <a:pPr lvl="0" algn="ctr">
-              <a:spcBef>
-                <a:spcPts val="600"/>
-              </a:spcBef>
-            </a:pPr>
-            <a:endParaRPr lang="en-US" sz="4400" dirty="0">
-              <a:latin typeface="Avenir Roman" panose="02000503020000020003" pitchFamily="2" charset="0"/>
-              <a:ea typeface="Verdana" panose="020B0604030504040204" pitchFamily="34" charset="0"/>
-              <a:cs typeface="Baghdad" pitchFamily="2" charset="-78"/>
-            </a:endParaRPr>
-          </a:p>
-          <a:p>
-            <a:pPr lvl="0" algn="ctr">
-              <a:spcBef>
-                <a:spcPts val="600"/>
-              </a:spcBef>
-            </a:pPr>
-            <a:endParaRPr lang="en-US" sz="4400" dirty="0">
-              <a:latin typeface="Avenir Roman" panose="02000503020000020003" pitchFamily="2" charset="0"/>
-              <a:ea typeface="Verdana" panose="020B0604030504040204" pitchFamily="34" charset="0"/>
-              <a:cs typeface="Baghdad" pitchFamily="2" charset="-78"/>
-            </a:endParaRPr>
-          </a:p>
-          <a:p>
-            <a:pPr lvl="0" algn="ctr">
-              <a:spcBef>
-                <a:spcPts val="600"/>
-              </a:spcBef>
-            </a:pPr>
-            <a:endParaRPr lang="en-US" sz="4400" dirty="0">
-              <a:latin typeface="Avenir Roman" panose="02000503020000020003" pitchFamily="2" charset="0"/>
-              <a:ea typeface="Verdana" panose="020B0604030504040204" pitchFamily="34" charset="0"/>
-              <a:cs typeface="Baghdad" pitchFamily="2" charset="-78"/>
-            </a:endParaRPr>
-          </a:p>
-          <a:p>
-            <a:pPr lvl="0" algn="ctr">
-              <a:spcBef>
-                <a:spcPts val="600"/>
-              </a:spcBef>
-            </a:pPr>
-            <a:endParaRPr lang="en-US" sz="4400" dirty="0">
-              <a:latin typeface="Avenir Roman" panose="02000503020000020003" pitchFamily="2" charset="0"/>
-              <a:ea typeface="Verdana" panose="020B0604030504040204" pitchFamily="34" charset="0"/>
-              <a:cs typeface="Baghdad" pitchFamily="2" charset="-78"/>
-            </a:endParaRPr>
-          </a:p>
           <a:p>
             <a:pPr lvl="0" algn="ctr">
               <a:spcBef>
@@ -8699,7 +8600,7 @@
         </p:nvSpPr>
         <p:spPr>
           <a:xfrm>
-            <a:off x="720725" y="22202143"/>
+            <a:off x="720725" y="21214591"/>
             <a:ext cx="13845581" cy="913287"/>
           </a:xfrm>
           <a:prstGeom prst="rect">
@@ -8811,8 +8712,8 @@
         </p:nvSpPr>
         <p:spPr>
           <a:xfrm>
-            <a:off x="29313783" y="13009561"/>
-            <a:ext cx="13845581" cy="19395243"/>
+            <a:off x="29313783" y="16080828"/>
+            <a:ext cx="13845581" cy="16323976"/>
           </a:xfrm>
           <a:prstGeom prst="rect">
             <a:avLst/>
@@ -8829,17 +8730,15 @@
           </a:ln>
         </p:spPr>
         <p:txBody>
-          <a:bodyPr wrap="square" rtlCol="0" anchor="t">
+          <a:bodyPr wrap="square" lIns="457200" tIns="274320" rIns="457200" bIns="274320" rtlCol="0" anchor="t">
             <a:noAutofit/>
           </a:bodyPr>
           <a:lstStyle/>
           <a:p>
-            <a:pPr marL="571500" lvl="4" indent="-571500">
+            <a:pPr lvl="4">
               <a:spcBef>
                 <a:spcPts val="600"/>
               </a:spcBef>
-              <a:buFont typeface="Arial" panose="020B0604020202020204" pitchFamily="34" charset="0"/>
-              <a:buChar char="•"/>
             </a:pPr>
             <a:r>
               <a:rPr lang="en-US" sz="4400" b="1" dirty="0">
@@ -8980,12 +8879,25 @@
             </a:r>
           </a:p>
           <a:p>
-            <a:pPr marL="571500" lvl="4" indent="-571500">
+            <a:pPr lvl="4">
               <a:spcBef>
                 <a:spcPts val="600"/>
               </a:spcBef>
-              <a:buFont typeface="Arial" panose="020B0604020202020204" pitchFamily="34" charset="0"/>
-              <a:buChar char="•"/>
+            </a:pPr>
+            <a:endParaRPr lang="en-US" sz="4400" b="1" dirty="0">
+              <a:solidFill>
+                <a:schemeClr val="tx1"/>
+              </a:solidFill>
+              <a:latin typeface="Avenir Roman" panose="02000503020000020003" pitchFamily="2" charset="0"/>
+              <a:ea typeface="Verdana" panose="020B0604030504040204" pitchFamily="34" charset="0"/>
+              <a:cs typeface="Baghdad" pitchFamily="2" charset="-78"/>
+            </a:endParaRPr>
+          </a:p>
+          <a:p>
+            <a:pPr lvl="4">
+              <a:spcBef>
+                <a:spcPts val="600"/>
+              </a:spcBef>
             </a:pPr>
             <a:r>
               <a:rPr lang="en-US" sz="4400" b="1" dirty="0">
@@ -9036,7 +8948,7 @@
                 <a:ea typeface="Verdana" panose="020B0604030504040204" pitchFamily="34" charset="0"/>
                 <a:cs typeface="Baghdad" pitchFamily="2" charset="-78"/>
               </a:rPr>
-              <a:t>The result might be surprising at first glance. However, the transparency report shows that the most significant features that led to this classification were age and priors count. </a:t>
+              <a:t>The result might be surprising at first glance. However, the transparency report shows that the most influential features that led to this classification were age and priors count. </a:t>
             </a:r>
           </a:p>
           <a:p>
@@ -9098,7 +9010,7 @@
         </p:nvSpPr>
         <p:spPr>
           <a:xfrm>
-            <a:off x="29313783" y="12096274"/>
+            <a:off x="29313782" y="15051642"/>
             <a:ext cx="13845581" cy="913287"/>
           </a:xfrm>
           <a:prstGeom prst="rect">
@@ -9154,8 +9066,8 @@
         </p:nvSpPr>
         <p:spPr>
           <a:xfrm>
-            <a:off x="720725" y="23115430"/>
-            <a:ext cx="13856693" cy="9243525"/>
+            <a:off x="720725" y="22127878"/>
+            <a:ext cx="13856693" cy="10231077"/>
           </a:xfrm>
           <a:prstGeom prst="rect">
             <a:avLst/>
@@ -9172,7 +9084,7 @@
           </a:ln>
         </p:spPr>
         <p:txBody>
-          <a:bodyPr wrap="square" rtlCol="0">
+          <a:bodyPr wrap="square" lIns="457200" tIns="274320" rIns="457200" bIns="274320" rtlCol="0">
             <a:noAutofit/>
           </a:bodyPr>
           <a:lstStyle/>
@@ -9278,7 +9190,7 @@
                 <a:ea typeface="Verdana" panose="020B0604030504040204" pitchFamily="34" charset="0"/>
                 <a:cs typeface="Baghdad" pitchFamily="2" charset="-78"/>
               </a:rPr>
-              <a:t>We defined our quantity of interest for unary QII as the probability of being predicted a given decile score category.</a:t>
+              <a:t>The quantity of interest for unary QII is the probability of being predicted a given decile score category.</a:t>
             </a:r>
           </a:p>
         </p:txBody>
@@ -9297,8 +9209,8 @@
         </p:nvSpPr>
         <p:spPr>
           <a:xfrm>
-            <a:off x="29308226" y="5484851"/>
-            <a:ext cx="13856693" cy="6254865"/>
+            <a:off x="29308226" y="5513426"/>
+            <a:ext cx="13856693" cy="9233513"/>
           </a:xfrm>
           <a:prstGeom prst="rect">
             <a:avLst/>
@@ -9315,7 +9227,7 @@
           </a:ln>
         </p:spPr>
         <p:txBody>
-          <a:bodyPr wrap="square" rtlCol="0">
+          <a:bodyPr wrap="square" lIns="457200" tIns="274320" rIns="457200" bIns="274320" rtlCol="0">
             <a:noAutofit/>
           </a:bodyPr>
           <a:lstStyle/>
@@ -9381,6 +9293,21 @@
               <a:ea typeface="Verdana" panose="020B0604030504040204" pitchFamily="34" charset="0"/>
               <a:cs typeface="Baghdad" pitchFamily="2" charset="-78"/>
             </a:endParaRPr>
+          </a:p>
+          <a:p>
+            <a:pPr lvl="0">
+              <a:spcBef>
+                <a:spcPts val="600"/>
+              </a:spcBef>
+            </a:pPr>
+            <a:r>
+              <a:rPr lang="en-US" sz="4400" dirty="0">
+                <a:latin typeface="Avenir Roman" panose="02000503020000020003" pitchFamily="2" charset="0"/>
+                <a:ea typeface="Verdana" panose="020B0604030504040204" pitchFamily="34" charset="0"/>
+                <a:cs typeface="Baghdad" pitchFamily="2" charset="-78"/>
+              </a:rPr>
+              <a:t>p00ps</a:t>
+            </a:r>
           </a:p>
         </p:txBody>
       </p:sp>
@@ -9461,7 +9388,7 @@
         </p:blipFill>
         <p:spPr>
           <a:xfrm>
-            <a:off x="909520" y="26733505"/>
+            <a:off x="915075" y="26057761"/>
             <a:ext cx="13479103" cy="1069084"/>
           </a:xfrm>
           <a:prstGeom prst="rect">
@@ -9490,8 +9417,85 @@
         </p:blipFill>
         <p:spPr>
           <a:xfrm>
-            <a:off x="3976423" y="29853227"/>
+            <a:off x="3976423" y="29268011"/>
             <a:ext cx="7334183" cy="886102"/>
+          </a:xfrm>
+          <a:prstGeom prst="rect">
+            <a:avLst/>
+          </a:prstGeom>
+        </p:spPr>
+      </p:pic>
+      <p:cxnSp>
+        <p:nvCxnSpPr>
+          <p:cNvPr id="49" name="Straight Connector 48">
+            <a:extLst>
+              <a:ext uri="{FF2B5EF4-FFF2-40B4-BE49-F238E27FC236}">
+                <a16:creationId xmlns:a16="http://schemas.microsoft.com/office/drawing/2014/main" id="{9FDBF0FE-C7D9-EC4D-B183-B904B02E0F5D}"/>
+              </a:ext>
+            </a:extLst>
+          </p:cNvPr>
+          <p:cNvCxnSpPr>
+            <a:cxnSpLocks/>
+          </p:cNvCxnSpPr>
+          <p:nvPr/>
+        </p:nvCxnSpPr>
+        <p:spPr>
+          <a:xfrm>
+            <a:off x="15400086" y="12696313"/>
+            <a:ext cx="13068804" cy="0"/>
+          </a:xfrm>
+          <a:prstGeom prst="line">
+            <a:avLst/>
+          </a:prstGeom>
+          <a:ln w="31750">
+            <a:solidFill>
+              <a:schemeClr val="bg1">
+                <a:lumMod val="65000"/>
+                <a:alpha val="36000"/>
+              </a:schemeClr>
+            </a:solidFill>
+            <a:prstDash val="sysDot"/>
+          </a:ln>
+        </p:spPr>
+        <p:style>
+          <a:lnRef idx="1">
+            <a:schemeClr val="accent1"/>
+          </a:lnRef>
+          <a:fillRef idx="0">
+            <a:schemeClr val="accent1"/>
+          </a:fillRef>
+          <a:effectRef idx="0">
+            <a:schemeClr val="accent1"/>
+          </a:effectRef>
+          <a:fontRef idx="minor">
+            <a:schemeClr val="tx1"/>
+          </a:fontRef>
+        </p:style>
+      </p:cxnSp>
+      <p:pic>
+        <p:nvPicPr>
+          <p:cNvPr id="56" name="Picture 55">
+            <a:extLst>
+              <a:ext uri="{FF2B5EF4-FFF2-40B4-BE49-F238E27FC236}">
+                <a16:creationId xmlns:a16="http://schemas.microsoft.com/office/drawing/2014/main" id="{C1988899-5BF6-4D4B-967B-EDC57EFE349F}"/>
+              </a:ext>
+            </a:extLst>
+          </p:cNvPr>
+          <p:cNvPicPr>
+            <a:picLocks noChangeAspect="1"/>
+          </p:cNvPicPr>
+          <p:nvPr/>
+        </p:nvPicPr>
+        <p:blipFill>
+          <a:blip r:embed="rId6"/>
+          <a:stretch>
+            <a:fillRect/>
+          </a:stretch>
+        </p:blipFill>
+        <p:spPr>
+          <a:xfrm>
+            <a:off x="15503209" y="25905313"/>
+            <a:ext cx="12862559" cy="6431280"/>
           </a:xfrm>
           <a:prstGeom prst="rect">
             <a:avLst/>
@@ -9513,13 +9517,13 @@
           <p:nvPr>
             <p:extLst>
               <p:ext uri="{D42A27DB-BD31-4B8C-83A1-F6EECF244321}">
-                <p14:modId xmlns:p14="http://schemas.microsoft.com/office/powerpoint/2010/main" val="983641527"/>
+                <p14:modId xmlns:p14="http://schemas.microsoft.com/office/powerpoint/2010/main" val="2291788505"/>
               </p:ext>
             </p:extLst>
           </p:nvPr>
         </p:nvGraphicFramePr>
         <p:xfrm>
-          <a:off x="15534157" y="21488600"/>
+          <a:off x="15497261" y="21658720"/>
           <a:ext cx="12874454" cy="4251960"/>
         </p:xfrm>
         <a:graphic>
@@ -9861,17 +9865,8 @@
                         <a:rPr lang="en-US" sz="2500" dirty="0">
                           <a:latin typeface="Avenir Roman" panose="02000503020000020003" pitchFamily="2" charset="0"/>
                         </a:rPr>
-                        <a:t>Two-Year </a:t>
+                        <a:t>Two-Year Recid</a:t>
                       </a:r>
-                      <a:r>
-                        <a:rPr lang="en-US" sz="2500" dirty="0" err="1">
-                          <a:latin typeface="Avenir Roman" panose="02000503020000020003" pitchFamily="2" charset="0"/>
-                        </a:rPr>
-                        <a:t>Recid</a:t>
-                      </a:r>
-                      <a:endParaRPr lang="en-US" sz="2500" dirty="0">
-                        <a:latin typeface="Avenir Roman" panose="02000503020000020003" pitchFamily="2" charset="0"/>
-                      </a:endParaRPr>
                     </a:p>
                   </a:txBody>
                   <a:tcPr/>
@@ -9902,128 +9897,6 @@
           </a:graphicData>
         </a:graphic>
       </p:graphicFrame>
-      <p:cxnSp>
-        <p:nvCxnSpPr>
-          <p:cNvPr id="49" name="Straight Connector 48">
-            <a:extLst>
-              <a:ext uri="{FF2B5EF4-FFF2-40B4-BE49-F238E27FC236}">
-                <a16:creationId xmlns:a16="http://schemas.microsoft.com/office/drawing/2014/main" id="{9FDBF0FE-C7D9-EC4D-B183-B904B02E0F5D}"/>
-              </a:ext>
-            </a:extLst>
-          </p:cNvPr>
-          <p:cNvCxnSpPr>
-            <a:cxnSpLocks/>
-          </p:cNvCxnSpPr>
-          <p:nvPr/>
-        </p:nvCxnSpPr>
-        <p:spPr>
-          <a:xfrm>
-            <a:off x="15308075" y="12294071"/>
-            <a:ext cx="13068804" cy="0"/>
-          </a:xfrm>
-          <a:prstGeom prst="line">
-            <a:avLst/>
-          </a:prstGeom>
-          <a:ln w="76200">
-            <a:solidFill>
-              <a:schemeClr val="bg1">
-                <a:lumMod val="65000"/>
-              </a:schemeClr>
-            </a:solidFill>
-            <a:prstDash val="lgDash"/>
-          </a:ln>
-        </p:spPr>
-        <p:style>
-          <a:lnRef idx="1">
-            <a:schemeClr val="accent1"/>
-          </a:lnRef>
-          <a:fillRef idx="0">
-            <a:schemeClr val="accent1"/>
-          </a:fillRef>
-          <a:effectRef idx="0">
-            <a:schemeClr val="accent1"/>
-          </a:effectRef>
-          <a:fontRef idx="minor">
-            <a:schemeClr val="tx1"/>
-          </a:fontRef>
-        </p:style>
-      </p:cxnSp>
-      <p:cxnSp>
-        <p:nvCxnSpPr>
-          <p:cNvPr id="59" name="Straight Connector 58">
-            <a:extLst>
-              <a:ext uri="{FF2B5EF4-FFF2-40B4-BE49-F238E27FC236}">
-                <a16:creationId xmlns:a16="http://schemas.microsoft.com/office/drawing/2014/main" id="{DCC8FB0D-C8F8-2444-BE2C-88D12B333539}"/>
-              </a:ext>
-            </a:extLst>
-          </p:cNvPr>
-          <p:cNvCxnSpPr>
-            <a:cxnSpLocks/>
-          </p:cNvCxnSpPr>
-          <p:nvPr/>
-        </p:nvCxnSpPr>
-        <p:spPr>
-          <a:xfrm>
-            <a:off x="15195427" y="20823555"/>
-            <a:ext cx="13570412" cy="0"/>
-          </a:xfrm>
-          <a:prstGeom prst="line">
-            <a:avLst/>
-          </a:prstGeom>
-          <a:ln w="76200">
-            <a:solidFill>
-              <a:schemeClr val="bg1">
-                <a:lumMod val="65000"/>
-              </a:schemeClr>
-            </a:solidFill>
-            <a:prstDash val="lgDash"/>
-          </a:ln>
-        </p:spPr>
-        <p:style>
-          <a:lnRef idx="1">
-            <a:schemeClr val="accent1"/>
-          </a:lnRef>
-          <a:fillRef idx="0">
-            <a:schemeClr val="accent1"/>
-          </a:fillRef>
-          <a:effectRef idx="0">
-            <a:schemeClr val="accent1"/>
-          </a:effectRef>
-          <a:fontRef idx="minor">
-            <a:schemeClr val="tx1"/>
-          </a:fontRef>
-        </p:style>
-      </p:cxnSp>
-      <p:pic>
-        <p:nvPicPr>
-          <p:cNvPr id="56" name="Picture 55">
-            <a:extLst>
-              <a:ext uri="{FF2B5EF4-FFF2-40B4-BE49-F238E27FC236}">
-                <a16:creationId xmlns:a16="http://schemas.microsoft.com/office/drawing/2014/main" id="{C1988899-5BF6-4D4B-967B-EDC57EFE349F}"/>
-              </a:ext>
-            </a:extLst>
-          </p:cNvPr>
-          <p:cNvPicPr>
-            <a:picLocks noChangeAspect="1"/>
-          </p:cNvPicPr>
-          <p:nvPr/>
-        </p:nvPicPr>
-        <p:blipFill>
-          <a:blip r:embed="rId6"/>
-          <a:stretch>
-            <a:fillRect/>
-          </a:stretch>
-        </p:blipFill>
-        <p:spPr>
-          <a:xfrm>
-            <a:off x="15514319" y="25905313"/>
-            <a:ext cx="12862559" cy="6431280"/>
-          </a:xfrm>
-          <a:prstGeom prst="rect">
-            <a:avLst/>
-          </a:prstGeom>
-        </p:spPr>
-      </p:pic>
       <p:pic>
         <p:nvPicPr>
           <p:cNvPr id="58" name="Picture 57">
@@ -10038,16 +9911,15 @@
           </p:cNvPicPr>
           <p:nvPr/>
         </p:nvPicPr>
-        <p:blipFill>
+        <p:blipFill rotWithShape="1">
           <a:blip r:embed="rId7"/>
-          <a:stretch>
-            <a:fillRect/>
-          </a:stretch>
+          <a:srcRect t="8295" b="2602"/>
+          <a:stretch/>
         </p:blipFill>
         <p:spPr>
           <a:xfrm>
-            <a:off x="15514319" y="5737878"/>
-            <a:ext cx="12868270" cy="6434135"/>
+            <a:off x="15500353" y="6431615"/>
+            <a:ext cx="12868270" cy="5732998"/>
           </a:xfrm>
           <a:prstGeom prst="rect">
             <a:avLst/>
@@ -10068,22 +9940,265 @@
           </p:cNvPicPr>
           <p:nvPr/>
         </p:nvPicPr>
-        <p:blipFill>
+        <p:blipFill rotWithShape="1">
           <a:blip r:embed="rId8"/>
-          <a:stretch>
-            <a:fillRect/>
-          </a:stretch>
+          <a:srcRect t="10340"/>
+          <a:stretch/>
         </p:blipFill>
         <p:spPr>
           <a:xfrm>
-            <a:off x="15513315" y="13220613"/>
-            <a:ext cx="12864566" cy="6432283"/>
+            <a:off x="15502205" y="13885703"/>
+            <a:ext cx="12864566" cy="5767193"/>
           </a:xfrm>
           <a:prstGeom prst="rect">
             <a:avLst/>
           </a:prstGeom>
+          <a:solidFill>
+            <a:srgbClr val="061818"/>
+          </a:solidFill>
         </p:spPr>
       </p:pic>
+      <p:cxnSp>
+        <p:nvCxnSpPr>
+          <p:cNvPr id="33" name="Straight Connector 32">
+            <a:extLst>
+              <a:ext uri="{FF2B5EF4-FFF2-40B4-BE49-F238E27FC236}">
+                <a16:creationId xmlns:a16="http://schemas.microsoft.com/office/drawing/2014/main" id="{FEA5E804-88B0-E645-BB63-F8DF9E74EE03}"/>
+              </a:ext>
+            </a:extLst>
+          </p:cNvPr>
+          <p:cNvCxnSpPr>
+            <a:cxnSpLocks/>
+          </p:cNvCxnSpPr>
+          <p:nvPr/>
+        </p:nvCxnSpPr>
+        <p:spPr>
+          <a:xfrm>
+            <a:off x="15652333" y="20549947"/>
+            <a:ext cx="13068804" cy="0"/>
+          </a:xfrm>
+          <a:prstGeom prst="line">
+            <a:avLst/>
+          </a:prstGeom>
+          <a:ln w="25400">
+            <a:solidFill>
+              <a:schemeClr val="bg1">
+                <a:lumMod val="65000"/>
+                <a:alpha val="36000"/>
+              </a:schemeClr>
+            </a:solidFill>
+            <a:prstDash val="sysDot"/>
+          </a:ln>
+        </p:spPr>
+        <p:style>
+          <a:lnRef idx="1">
+            <a:schemeClr val="accent1"/>
+          </a:lnRef>
+          <a:fillRef idx="0">
+            <a:schemeClr val="accent1"/>
+          </a:fillRef>
+          <a:effectRef idx="0">
+            <a:schemeClr val="accent1"/>
+          </a:effectRef>
+          <a:fontRef idx="minor">
+            <a:schemeClr val="tx1"/>
+          </a:fontRef>
+        </p:style>
+      </p:cxnSp>
+      <p:sp>
+        <p:nvSpPr>
+          <p:cNvPr id="4" name="TextBox 3">
+            <a:extLst>
+              <a:ext uri="{FF2B5EF4-FFF2-40B4-BE49-F238E27FC236}">
+                <a16:creationId xmlns:a16="http://schemas.microsoft.com/office/drawing/2014/main" id="{206E4373-A1DE-574B-8814-D4393682E849}"/>
+              </a:ext>
+            </a:extLst>
+          </p:cNvPr>
+          <p:cNvSpPr txBox="1"/>
+          <p:nvPr/>
+        </p:nvSpPr>
+        <p:spPr>
+          <a:xfrm>
+            <a:off x="15652332" y="5905451"/>
+            <a:ext cx="12713435" cy="523220"/>
+          </a:xfrm>
+          <a:prstGeom prst="rect">
+            <a:avLst/>
+          </a:prstGeom>
+          <a:noFill/>
+        </p:spPr>
+        <p:txBody>
+          <a:bodyPr wrap="square" rtlCol="0">
+            <a:spAutoFit/>
+          </a:bodyPr>
+          <a:lstStyle/>
+          <a:p>
+            <a:pPr algn="ctr"/>
+            <a:r>
+              <a:rPr lang="en-US" sz="2800" b="1" dirty="0">
+                <a:latin typeface="Avenir Book" panose="02000503020000020003" pitchFamily="2" charset="0"/>
+              </a:rPr>
+              <a:t>Figure 1. </a:t>
+            </a:r>
+            <a:r>
+              <a:rPr lang="en-US" sz="2800" dirty="0">
+                <a:latin typeface="Avenir Book" panose="02000503020000020003" pitchFamily="2" charset="0"/>
+              </a:rPr>
+              <a:t>Unary QIIs on Individual Outcomes</a:t>
+            </a:r>
+          </a:p>
+        </p:txBody>
+      </p:sp>
+      <p:sp>
+        <p:nvSpPr>
+          <p:cNvPr id="34" name="TextBox 33">
+            <a:extLst>
+              <a:ext uri="{FF2B5EF4-FFF2-40B4-BE49-F238E27FC236}">
+                <a16:creationId xmlns:a16="http://schemas.microsoft.com/office/drawing/2014/main" id="{2E5C9FC6-0AC7-5444-9461-8DD4BCF098B6}"/>
+              </a:ext>
+            </a:extLst>
+          </p:cNvPr>
+          <p:cNvSpPr txBox="1"/>
+          <p:nvPr/>
+        </p:nvSpPr>
+        <p:spPr>
+          <a:xfrm>
+            <a:off x="15644712" y="13447077"/>
+            <a:ext cx="12713435" cy="523220"/>
+          </a:xfrm>
+          <a:prstGeom prst="rect">
+            <a:avLst/>
+          </a:prstGeom>
+          <a:solidFill>
+            <a:schemeClr val="bg1"/>
+          </a:solidFill>
+          <a:ln>
+            <a:noFill/>
+          </a:ln>
+        </p:spPr>
+        <p:txBody>
+          <a:bodyPr wrap="square" rtlCol="0">
+            <a:spAutoFit/>
+          </a:bodyPr>
+          <a:lstStyle/>
+          <a:p>
+            <a:pPr algn="ctr"/>
+            <a:r>
+              <a:rPr lang="en-US" sz="2800" b="1" dirty="0">
+                <a:latin typeface="Avenir Book" panose="02000503020000020003" pitchFamily="2" charset="0"/>
+              </a:rPr>
+              <a:t>Figure 2. </a:t>
+            </a:r>
+            <a:r>
+              <a:rPr lang="en-US" sz="2800" dirty="0">
+                <a:latin typeface="Avenir Book" panose="02000503020000020003" pitchFamily="2" charset="0"/>
+              </a:rPr>
+              <a:t>Unary QII on Group Disparity – Caucasian vs. Other</a:t>
+            </a:r>
+          </a:p>
+        </p:txBody>
+      </p:sp>
+      <p:sp>
+        <p:nvSpPr>
+          <p:cNvPr id="35" name="TextBox 34">
+            <a:extLst>
+              <a:ext uri="{FF2B5EF4-FFF2-40B4-BE49-F238E27FC236}">
+                <a16:creationId xmlns:a16="http://schemas.microsoft.com/office/drawing/2014/main" id="{8D3A424B-BFD4-D149-8C84-37F3EE5E84DF}"/>
+              </a:ext>
+            </a:extLst>
+          </p:cNvPr>
+          <p:cNvSpPr txBox="1"/>
+          <p:nvPr/>
+        </p:nvSpPr>
+        <p:spPr>
+          <a:xfrm>
+            <a:off x="15497261" y="20825269"/>
+            <a:ext cx="12713435" cy="523220"/>
+          </a:xfrm>
+          <a:prstGeom prst="rect">
+            <a:avLst/>
+          </a:prstGeom>
+          <a:solidFill>
+            <a:schemeClr val="bg1"/>
+          </a:solidFill>
+          <a:ln>
+            <a:noFill/>
+          </a:ln>
+        </p:spPr>
+        <p:txBody>
+          <a:bodyPr wrap="square" rtlCol="0">
+            <a:spAutoFit/>
+          </a:bodyPr>
+          <a:lstStyle/>
+          <a:p>
+            <a:pPr algn="ctr"/>
+            <a:r>
+              <a:rPr lang="en-US" sz="2800" b="1" dirty="0">
+                <a:latin typeface="Avenir Book" panose="02000503020000020003" pitchFamily="2" charset="0"/>
+              </a:rPr>
+              <a:t>Figure 3. </a:t>
+            </a:r>
+            <a:r>
+              <a:rPr lang="en-US" sz="2800" dirty="0">
+                <a:latin typeface="Avenir Book" panose="02000503020000020003" pitchFamily="2" charset="0"/>
+              </a:rPr>
+              <a:t>Transparency Report for Ms. X</a:t>
+            </a:r>
+          </a:p>
+        </p:txBody>
+      </p:sp>
+      <p:sp>
+        <p:nvSpPr>
+          <p:cNvPr id="5" name="Rectangle 4">
+            <a:extLst>
+              <a:ext uri="{FF2B5EF4-FFF2-40B4-BE49-F238E27FC236}">
+                <a16:creationId xmlns:a16="http://schemas.microsoft.com/office/drawing/2014/main" id="{8858E1DE-FF1D-A247-AB5A-396DA4F6F691}"/>
+              </a:ext>
+            </a:extLst>
+          </p:cNvPr>
+          <p:cNvSpPr/>
+          <p:nvPr/>
+        </p:nvSpPr>
+        <p:spPr>
+          <a:xfrm>
+            <a:off x="19300371" y="25961328"/>
+            <a:ext cx="6074229" cy="474443"/>
+          </a:xfrm>
+          <a:prstGeom prst="rect">
+            <a:avLst/>
+          </a:prstGeom>
+          <a:solidFill>
+            <a:schemeClr val="bg1"/>
+          </a:solidFill>
+          <a:ln>
+            <a:noFill/>
+          </a:ln>
+        </p:spPr>
+        <p:style>
+          <a:lnRef idx="2">
+            <a:schemeClr val="accent1">
+              <a:shade val="50000"/>
+            </a:schemeClr>
+          </a:lnRef>
+          <a:fillRef idx="1">
+            <a:schemeClr val="accent1"/>
+          </a:fillRef>
+          <a:effectRef idx="0">
+            <a:schemeClr val="accent1"/>
+          </a:effectRef>
+          <a:fontRef idx="minor">
+            <a:schemeClr val="lt1"/>
+          </a:fontRef>
+        </p:style>
+        <p:txBody>
+          <a:bodyPr rtlCol="0" anchor="ctr"/>
+          <a:lstStyle/>
+          <a:p>
+            <a:pPr algn="ctr"/>
+            <a:endParaRPr lang="en-US"/>
+          </a:p>
+        </p:txBody>
+      </p:sp>
     </p:spTree>
   </p:cSld>
   <p:clrMapOvr>

</xml_diff>

<commit_message>
made some final changes to the poster p000000
</commit_message>
<xml_diff>
--- a/poster/poster_ac221.pptx
+++ b/poster/poster_ac221.pptx
@@ -7979,7 +7979,7 @@
                 <a:ea typeface="Verdana" panose="020B0604030504040204" pitchFamily="34" charset="0"/>
                 <a:cs typeface="Baghdad" pitchFamily="2" charset="-78"/>
               </a:rPr>
-              <a:t>Quantitative Input Influence: A study of influence of inputs in recidivism decisions</a:t>
+              <a:t>A study of influence of inputs on automated recidivism decisions</a:t>
             </a:r>
           </a:p>
           <a:p>
@@ -8247,6 +8247,85 @@
           </a:p>
         </p:txBody>
       </p:sp>
+      <p:pic>
+        <p:nvPicPr>
+          <p:cNvPr id="13" name="Picture 12">
+            <a:extLst>
+              <a:ext uri="{FF2B5EF4-FFF2-40B4-BE49-F238E27FC236}">
+                <a16:creationId xmlns:a16="http://schemas.microsoft.com/office/drawing/2014/main" id="{4EC363FF-F411-8C4D-87C8-8522E0B7787C}"/>
+              </a:ext>
+            </a:extLst>
+          </p:cNvPr>
+          <p:cNvPicPr>
+            <a:picLocks noChangeAspect="1"/>
+          </p:cNvPicPr>
+          <p:nvPr/>
+        </p:nvPicPr>
+        <p:blipFill rotWithShape="1">
+          <a:blip r:embed="rId3"/>
+          <a:srcRect r="83921" b="14291"/>
+          <a:stretch/>
+        </p:blipFill>
+        <p:spPr>
+          <a:xfrm>
+            <a:off x="1151166" y="-32982"/>
+            <a:ext cx="2629458" cy="4019883"/>
+          </a:xfrm>
+          <a:prstGeom prst="rect">
+            <a:avLst/>
+          </a:prstGeom>
+        </p:spPr>
+      </p:pic>
+      <p:sp>
+        <p:nvSpPr>
+          <p:cNvPr id="40" name="TextBox 39">
+            <a:extLst>
+              <a:ext uri="{FF2B5EF4-FFF2-40B4-BE49-F238E27FC236}">
+                <a16:creationId xmlns:a16="http://schemas.microsoft.com/office/drawing/2014/main" id="{FEF0ABDD-8EC0-AA4F-B901-6347F8E3E681}"/>
+              </a:ext>
+            </a:extLst>
+          </p:cNvPr>
+          <p:cNvSpPr txBox="1"/>
+          <p:nvPr/>
+        </p:nvSpPr>
+        <p:spPr>
+          <a:xfrm>
+            <a:off x="15022810" y="5506623"/>
+            <a:ext cx="13845581" cy="26919953"/>
+          </a:xfrm>
+          <a:prstGeom prst="rect">
+            <a:avLst/>
+          </a:prstGeom>
+          <a:solidFill>
+            <a:schemeClr val="bg1"/>
+          </a:solidFill>
+          <a:ln w="76200">
+            <a:solidFill>
+              <a:schemeClr val="bg2">
+                <a:lumMod val="75000"/>
+              </a:schemeClr>
+            </a:solidFill>
+          </a:ln>
+        </p:spPr>
+        <p:txBody>
+          <a:bodyPr wrap="square" rtlCol="0">
+            <a:noAutofit/>
+          </a:bodyPr>
+          <a:lstStyle/>
+          <a:p>
+            <a:pPr lvl="0" algn="ctr">
+              <a:spcBef>
+                <a:spcPts val="600"/>
+              </a:spcBef>
+            </a:pPr>
+            <a:endParaRPr lang="en-US" sz="4400" dirty="0">
+              <a:latin typeface="Avenir Roman" panose="02000503020000020003" pitchFamily="2" charset="0"/>
+              <a:ea typeface="Verdana" panose="020B0604030504040204" pitchFamily="34" charset="0"/>
+              <a:cs typeface="Baghdad" pitchFamily="2" charset="-78"/>
+            </a:endParaRPr>
+          </a:p>
+        </p:txBody>
+      </p:sp>
       <p:sp>
         <p:nvSpPr>
           <p:cNvPr id="2" name="TextBox 1"/>
@@ -8255,7 +8334,7 @@
         </p:nvSpPr>
         <p:spPr>
           <a:xfrm>
-            <a:off x="731837" y="5484850"/>
+            <a:off x="720725" y="5484850"/>
             <a:ext cx="13845581" cy="15379686"/>
           </a:xfrm>
           <a:prstGeom prst="rect">
@@ -8273,10 +8352,27 @@
           </a:ln>
         </p:spPr>
         <p:txBody>
-          <a:bodyPr wrap="square" lIns="457200" tIns="274320" rIns="457200" bIns="274320" rtlCol="0" anchor="t">
+          <a:bodyPr wrap="square" lIns="411480" tIns="274320" rIns="411480" bIns="274320" rtlCol="0" anchor="t">
             <a:noAutofit/>
           </a:bodyPr>
           <a:lstStyle/>
+          <a:p>
+            <a:pPr marL="614363" lvl="0" indent="-614363" algn="just">
+              <a:spcBef>
+                <a:spcPts val="600"/>
+              </a:spcBef>
+              <a:buFont typeface="Arial" charset="0"/>
+              <a:buChar char="•"/>
+            </a:pPr>
+            <a:endParaRPr lang="en-US" sz="1000" dirty="0">
+              <a:solidFill>
+                <a:schemeClr val="tx1"/>
+              </a:solidFill>
+              <a:latin typeface="Avenir Roman" panose="02000503020000020003" pitchFamily="2" charset="0"/>
+              <a:ea typeface="Verdana" panose="020B0604030504040204" pitchFamily="34" charset="0"/>
+              <a:cs typeface="Baghdad" pitchFamily="2" charset="-78"/>
+            </a:endParaRPr>
+          </a:p>
           <a:p>
             <a:pPr marL="614363" lvl="0" indent="-614363" algn="just">
               <a:spcBef>
@@ -8294,7 +8390,7 @@
                 <a:ea typeface="Verdana" panose="020B0604030504040204" pitchFamily="34" charset="0"/>
                 <a:cs typeface="Baghdad" pitchFamily="2" charset="-78"/>
               </a:rPr>
-              <a:t>Automated decision making has gained popularity in hiring and sentencing procedures. Fairness of automated processes, however, remains questionable due to limited interpretability of the black box models.  </a:t>
+              <a:t>Automated decision making has gained popularity in hiring and sentencing procedures. Fairness of automated processes, however, remains an open question due to limited interpretability of the black box models.  </a:t>
             </a:r>
           </a:p>
           <a:p>
@@ -8356,7 +8452,7 @@
                 <a:ea typeface="Verdana" panose="020B0604030504040204" pitchFamily="34" charset="0"/>
                 <a:cs typeface="Baghdad" pitchFamily="2" charset="-78"/>
               </a:rPr>
-              <a:t>Influences are acquired by comparing the difference in the quantity of interests (e.g. probability of being hired) between using the actual, and a random feature distribution.</a:t>
+              <a:t>Influence is computed as a difference between the actual feature distribution and a random feature distribution.</a:t>
             </a:r>
           </a:p>
           <a:p>
@@ -8376,7 +8472,22 @@
                 <a:ea typeface="Verdana" panose="020B0604030504040204" pitchFamily="34" charset="0"/>
                 <a:cs typeface="Baghdad" pitchFamily="2" charset="-78"/>
               </a:rPr>
-              <a:t>We applied this framework to classification algorithms, using the COMPAS dataset, to investigate fairness of COMPAS assignment of decile scores. </a:t>
+              <a:t>We applied this framework to classification algorithms, using criminal records of </a:t>
+            </a:r>
+            <a:r>
+              <a:rPr lang="en-US" sz="4400" dirty="0"/>
+              <a:t>7,214</a:t>
+            </a:r>
+            <a:r>
+              <a:rPr lang="en-US" sz="4400" dirty="0">
+                <a:solidFill>
+                  <a:schemeClr val="tx1"/>
+                </a:solidFill>
+                <a:latin typeface="Avenir Roman" panose="02000503020000020003" pitchFamily="2" charset="0"/>
+                <a:ea typeface="Verdana" panose="020B0604030504040204" pitchFamily="34" charset="0"/>
+                <a:cs typeface="Baghdad" pitchFamily="2" charset="-78"/>
+              </a:rPr>
+              <a:t> individuals in Broward County, FL, to investigate fairness of COMPAS assignment of decile scores. </a:t>
             </a:r>
           </a:p>
           <a:p>
@@ -8396,137 +8507,118 @@
                 <a:ea typeface="Verdana" panose="020B0604030504040204" pitchFamily="34" charset="0"/>
                 <a:cs typeface="Baghdad" pitchFamily="2" charset="-78"/>
               </a:rPr>
-              <a:t>We modeled the assignment of violence decile scores using individuals’ age, sex, race, priors and misdemeanor counts. We trained three classifiers and report on the Decision Tree.</a:t>
+              <a:t>We modeled the assignment of violence decile scores using individuals’ </a:t>
             </a:r>
-          </a:p>
-        </p:txBody>
-      </p:sp>
-      <p:grpSp>
-        <p:nvGrpSpPr>
-          <p:cNvPr id="16" name="Group 15">
-            <a:extLst>
-              <a:ext uri="{FF2B5EF4-FFF2-40B4-BE49-F238E27FC236}">
-                <a16:creationId xmlns:a16="http://schemas.microsoft.com/office/drawing/2014/main" id="{2419AE6E-AEEA-0145-8C36-FF28950FE4BE}"/>
-              </a:ext>
-            </a:extLst>
-          </p:cNvPr>
-          <p:cNvGrpSpPr/>
-          <p:nvPr/>
-        </p:nvGrpSpPr>
-        <p:grpSpPr>
-          <a:xfrm>
-            <a:off x="1151166" y="2550051"/>
-            <a:ext cx="2100034" cy="1436850"/>
-            <a:chOff x="628650" y="1872542"/>
-            <a:chExt cx="3090250" cy="2114359"/>
-          </a:xfrm>
-        </p:grpSpPr>
-        <p:pic>
-          <p:nvPicPr>
-            <p:cNvPr id="11" name="Picture 10">
-              <a:extLst>
-                <a:ext uri="{FF2B5EF4-FFF2-40B4-BE49-F238E27FC236}">
-                  <a16:creationId xmlns:a16="http://schemas.microsoft.com/office/drawing/2014/main" id="{D8E1C113-D780-CB4F-B102-2E4C3A28A440}"/>
-                </a:ext>
-              </a:extLst>
-            </p:cNvPr>
-            <p:cNvPicPr>
-              <a:picLocks noChangeAspect="1"/>
-            </p:cNvPicPr>
-            <p:nvPr/>
-          </p:nvPicPr>
-          <p:blipFill rotWithShape="1">
-            <a:blip r:embed="rId3"/>
-            <a:srcRect r="76396"/>
-            <a:stretch/>
-          </p:blipFill>
-          <p:spPr>
-            <a:xfrm>
-              <a:off x="2335870" y="2360818"/>
-              <a:ext cx="1383030" cy="1607795"/>
-            </a:xfrm>
-            <a:prstGeom prst="rect">
-              <a:avLst/>
-            </a:prstGeom>
-          </p:spPr>
-        </p:pic>
-        <p:pic>
-          <p:nvPicPr>
-            <p:cNvPr id="13" name="Picture 12">
-              <a:extLst>
-                <a:ext uri="{FF2B5EF4-FFF2-40B4-BE49-F238E27FC236}">
-                  <a16:creationId xmlns:a16="http://schemas.microsoft.com/office/drawing/2014/main" id="{4EC363FF-F411-8C4D-87C8-8522E0B7787C}"/>
-                </a:ext>
-              </a:extLst>
-            </p:cNvPr>
-            <p:cNvPicPr>
-              <a:picLocks noChangeAspect="1"/>
-            </p:cNvPicPr>
-            <p:nvPr/>
-          </p:nvPicPr>
-          <p:blipFill rotWithShape="1">
-            <a:blip r:embed="rId4"/>
-            <a:srcRect r="83921" b="14291"/>
-            <a:stretch/>
-          </p:blipFill>
-          <p:spPr>
-            <a:xfrm>
-              <a:off x="628650" y="1872542"/>
-              <a:ext cx="1383030" cy="2114359"/>
-            </a:xfrm>
-            <a:prstGeom prst="rect">
-              <a:avLst/>
-            </a:prstGeom>
-          </p:spPr>
-        </p:pic>
-      </p:grpSp>
-      <p:sp>
-        <p:nvSpPr>
-          <p:cNvPr id="40" name="TextBox 39">
-            <a:extLst>
-              <a:ext uri="{FF2B5EF4-FFF2-40B4-BE49-F238E27FC236}">
-                <a16:creationId xmlns:a16="http://schemas.microsoft.com/office/drawing/2014/main" id="{FEF0ABDD-8EC0-AA4F-B901-6347F8E3E681}"/>
-              </a:ext>
-            </a:extLst>
-          </p:cNvPr>
-          <p:cNvSpPr txBox="1"/>
-          <p:nvPr/>
-        </p:nvSpPr>
-        <p:spPr>
-          <a:xfrm>
-            <a:off x="15022810" y="5506623"/>
-            <a:ext cx="13845581" cy="26919953"/>
-          </a:xfrm>
-          <a:prstGeom prst="rect">
-            <a:avLst/>
-          </a:prstGeom>
-          <a:solidFill>
-            <a:schemeClr val="bg1"/>
-          </a:solidFill>
-          <a:ln w="76200">
-            <a:solidFill>
-              <a:schemeClr val="bg2">
-                <a:lumMod val="75000"/>
-              </a:schemeClr>
-            </a:solidFill>
-          </a:ln>
-        </p:spPr>
-        <p:txBody>
-          <a:bodyPr wrap="square" rtlCol="0">
-            <a:noAutofit/>
-          </a:bodyPr>
-          <a:lstStyle/>
-          <a:p>
-            <a:pPr lvl="0" algn="ctr">
-              <a:spcBef>
-                <a:spcPts val="600"/>
-              </a:spcBef>
-            </a:pPr>
-            <a:endParaRPr lang="en-US" sz="4400" dirty="0">
-              <a:latin typeface="Avenir Roman" panose="02000503020000020003" pitchFamily="2" charset="0"/>
-              <a:ea typeface="Verdana" panose="020B0604030504040204" pitchFamily="34" charset="0"/>
-              <a:cs typeface="Baghdad" pitchFamily="2" charset="-78"/>
-            </a:endParaRPr>
+            <a:r>
+              <a:rPr lang="en-US" sz="4400" i="1" dirty="0">
+                <a:solidFill>
+                  <a:schemeClr val="tx1"/>
+                </a:solidFill>
+                <a:latin typeface="Avenir Roman" panose="02000503020000020003" pitchFamily="2" charset="0"/>
+                <a:ea typeface="Verdana" panose="020B0604030504040204" pitchFamily="34" charset="0"/>
+                <a:cs typeface="Baghdad" pitchFamily="2" charset="-78"/>
+              </a:rPr>
+              <a:t>Age</a:t>
+            </a:r>
+            <a:r>
+              <a:rPr lang="en-US" sz="4400" dirty="0">
+                <a:solidFill>
+                  <a:schemeClr val="tx1"/>
+                </a:solidFill>
+                <a:latin typeface="Avenir Roman" panose="02000503020000020003" pitchFamily="2" charset="0"/>
+                <a:ea typeface="Verdana" panose="020B0604030504040204" pitchFamily="34" charset="0"/>
+                <a:cs typeface="Baghdad" pitchFamily="2" charset="-78"/>
+              </a:rPr>
+              <a:t>, </a:t>
+            </a:r>
+            <a:r>
+              <a:rPr lang="en-US" sz="4400" i="1" dirty="0">
+                <a:solidFill>
+                  <a:schemeClr val="tx1"/>
+                </a:solidFill>
+                <a:latin typeface="Avenir Roman" panose="02000503020000020003" pitchFamily="2" charset="0"/>
+                <a:ea typeface="Verdana" panose="020B0604030504040204" pitchFamily="34" charset="0"/>
+                <a:cs typeface="Baghdad" pitchFamily="2" charset="-78"/>
+              </a:rPr>
+              <a:t>Sex</a:t>
+            </a:r>
+            <a:r>
+              <a:rPr lang="en-US" sz="4400" dirty="0">
+                <a:solidFill>
+                  <a:schemeClr val="tx1"/>
+                </a:solidFill>
+                <a:latin typeface="Avenir Roman" panose="02000503020000020003" pitchFamily="2" charset="0"/>
+                <a:ea typeface="Verdana" panose="020B0604030504040204" pitchFamily="34" charset="0"/>
+                <a:cs typeface="Baghdad" pitchFamily="2" charset="-78"/>
+              </a:rPr>
+              <a:t>, </a:t>
+            </a:r>
+            <a:r>
+              <a:rPr lang="en-US" sz="4400" i="1" dirty="0">
+                <a:solidFill>
+                  <a:schemeClr val="tx1"/>
+                </a:solidFill>
+                <a:latin typeface="Avenir Roman" panose="02000503020000020003" pitchFamily="2" charset="0"/>
+                <a:ea typeface="Verdana" panose="020B0604030504040204" pitchFamily="34" charset="0"/>
+                <a:cs typeface="Baghdad" pitchFamily="2" charset="-78"/>
+              </a:rPr>
+              <a:t>Race</a:t>
+            </a:r>
+            <a:r>
+              <a:rPr lang="en-US" sz="4400" dirty="0">
+                <a:solidFill>
+                  <a:schemeClr val="tx1"/>
+                </a:solidFill>
+                <a:latin typeface="Avenir Roman" panose="02000503020000020003" pitchFamily="2" charset="0"/>
+                <a:ea typeface="Verdana" panose="020B0604030504040204" pitchFamily="34" charset="0"/>
+                <a:cs typeface="Baghdad" pitchFamily="2" charset="-78"/>
+              </a:rPr>
+              <a:t>, </a:t>
+            </a:r>
+            <a:r>
+              <a:rPr lang="en-US" sz="4400" i="1" dirty="0">
+                <a:solidFill>
+                  <a:schemeClr val="tx1"/>
+                </a:solidFill>
+                <a:latin typeface="Avenir Roman" panose="02000503020000020003" pitchFamily="2" charset="0"/>
+                <a:ea typeface="Verdana" panose="020B0604030504040204" pitchFamily="34" charset="0"/>
+                <a:cs typeface="Baghdad" pitchFamily="2" charset="-78"/>
+              </a:rPr>
+              <a:t>Priors,</a:t>
+            </a:r>
+            <a:r>
+              <a:rPr lang="en-US" sz="4400" dirty="0">
+                <a:solidFill>
+                  <a:schemeClr val="tx1"/>
+                </a:solidFill>
+                <a:latin typeface="Avenir Roman" panose="02000503020000020003" pitchFamily="2" charset="0"/>
+                <a:ea typeface="Verdana" panose="020B0604030504040204" pitchFamily="34" charset="0"/>
+                <a:cs typeface="Baghdad" pitchFamily="2" charset="-78"/>
+              </a:rPr>
+              <a:t> and </a:t>
+            </a:r>
+            <a:r>
+              <a:rPr lang="en-US" sz="4400" i="1" dirty="0">
+                <a:solidFill>
+                  <a:schemeClr val="tx1"/>
+                </a:solidFill>
+                <a:latin typeface="Avenir Roman" panose="02000503020000020003" pitchFamily="2" charset="0"/>
+                <a:ea typeface="Verdana" panose="020B0604030504040204" pitchFamily="34" charset="0"/>
+                <a:cs typeface="Baghdad" pitchFamily="2" charset="-78"/>
+              </a:rPr>
+              <a:t>Misdemeanor Counts</a:t>
+            </a:r>
+            <a:r>
+              <a:rPr lang="en-US" sz="4400" dirty="0">
+                <a:solidFill>
+                  <a:schemeClr val="tx1"/>
+                </a:solidFill>
+                <a:latin typeface="Avenir Roman" panose="02000503020000020003" pitchFamily="2" charset="0"/>
+                <a:ea typeface="Verdana" panose="020B0604030504040204" pitchFamily="34" charset="0"/>
+                <a:cs typeface="Baghdad" pitchFamily="2" charset="-78"/>
+              </a:rPr>
+              <a:t>. We trained three classifiers and report on the Decision Tree.</a:t>
+            </a:r>
           </a:p>
         </p:txBody>
       </p:sp>
@@ -8544,7 +8636,7 @@
         </p:nvSpPr>
         <p:spPr>
           <a:xfrm>
-            <a:off x="731837" y="4571564"/>
+            <a:off x="720725" y="4571563"/>
             <a:ext cx="13845581" cy="913287"/>
           </a:xfrm>
           <a:prstGeom prst="rect">
@@ -8656,7 +8748,7 @@
         </p:nvSpPr>
         <p:spPr>
           <a:xfrm>
-            <a:off x="29313783" y="4571564"/>
+            <a:off x="29319338" y="4571563"/>
             <a:ext cx="13845581" cy="913287"/>
           </a:xfrm>
           <a:prstGeom prst="rect">
@@ -8712,7 +8804,7 @@
         </p:nvSpPr>
         <p:spPr>
           <a:xfrm>
-            <a:off x="29313783" y="16080828"/>
+            <a:off x="29319338" y="16102600"/>
             <a:ext cx="13845581" cy="16323976"/>
           </a:xfrm>
           <a:prstGeom prst="rect">
@@ -8730,12 +8822,27 @@
           </a:ln>
         </p:spPr>
         <p:txBody>
-          <a:bodyPr wrap="square" lIns="457200" tIns="274320" rIns="457200" bIns="274320" rtlCol="0" anchor="t">
+          <a:bodyPr wrap="square" lIns="411480" tIns="274320" rIns="411480" bIns="274320" rtlCol="0" anchor="t">
             <a:noAutofit/>
           </a:bodyPr>
           <a:lstStyle/>
           <a:p>
-            <a:pPr lvl="4">
+            <a:pPr lvl="4" algn="just">
+              <a:spcBef>
+                <a:spcPts val="600"/>
+              </a:spcBef>
+            </a:pPr>
+            <a:endParaRPr lang="en-US" sz="1000" b="1" dirty="0">
+              <a:solidFill>
+                <a:schemeClr val="tx1"/>
+              </a:solidFill>
+              <a:latin typeface="Avenir Roman" panose="02000503020000020003" pitchFamily="2" charset="0"/>
+              <a:ea typeface="Verdana" panose="020B0604030504040204" pitchFamily="34" charset="0"/>
+              <a:cs typeface="Baghdad" pitchFamily="2" charset="-78"/>
+            </a:endParaRPr>
+          </a:p>
+          <a:p>
+            <a:pPr lvl="4" algn="just">
               <a:spcBef>
                 <a:spcPts val="600"/>
               </a:spcBef>
@@ -8753,7 +8860,7 @@
             </a:r>
           </a:p>
           <a:p>
-            <a:pPr marL="571500" lvl="5" indent="-571500">
+            <a:pPr marL="571500" lvl="5" indent="-571500" algn="just">
               <a:spcBef>
                 <a:spcPts val="600"/>
               </a:spcBef>
@@ -8780,7 +8887,7 @@
                 <a:ea typeface="Verdana" panose="020B0604030504040204" pitchFamily="34" charset="0"/>
                 <a:cs typeface="Baghdad" pitchFamily="2" charset="-78"/>
               </a:rPr>
-              <a:t>priors count</a:t>
+              <a:t>Priors Count</a:t>
             </a:r>
             <a:r>
               <a:rPr lang="en-US" sz="4400" dirty="0">
@@ -8802,7 +8909,7 @@
                 <a:ea typeface="Verdana" panose="020B0604030504040204" pitchFamily="34" charset="0"/>
                 <a:cs typeface="Baghdad" pitchFamily="2" charset="-78"/>
               </a:rPr>
-              <a:t>age</a:t>
+              <a:t>Age</a:t>
             </a:r>
             <a:r>
               <a:rPr lang="en-US" sz="4400" dirty="0">
@@ -8824,7 +8931,7 @@
                 <a:ea typeface="Verdana" panose="020B0604030504040204" pitchFamily="34" charset="0"/>
                 <a:cs typeface="Baghdad" pitchFamily="2" charset="-78"/>
               </a:rPr>
-              <a:t> juvenile misdemeanor count</a:t>
+              <a:t> Juvenile Misdemeanor Count</a:t>
             </a:r>
             <a:r>
               <a:rPr lang="en-US" sz="4400" dirty="0">
@@ -8839,7 +8946,7 @@
             </a:r>
           </a:p>
           <a:p>
-            <a:pPr marL="571500" lvl="5" indent="-571500">
+            <a:pPr marL="571500" lvl="5" indent="-571500" algn="just">
               <a:spcBef>
                 <a:spcPts val="600"/>
               </a:spcBef>
@@ -8855,11 +8962,11 @@
                 <a:ea typeface="Verdana" panose="020B0604030504040204" pitchFamily="34" charset="0"/>
                 <a:cs typeface="Baghdad" pitchFamily="2" charset="-78"/>
               </a:rPr>
-              <a:t>Group disparity reports that predicted low and medium decile scores, these three features appear to bias for or against Caucasians. </a:t>
+              <a:t>Group disparity reports that for predicted low and medium decile scores, these three features appear to bias for or against Caucasians. </a:t>
             </a:r>
           </a:p>
           <a:p>
-            <a:pPr marL="571500" lvl="5" indent="-571500">
+            <a:pPr marL="571500" lvl="5" indent="-571500" algn="just">
               <a:spcBef>
                 <a:spcPts val="600"/>
               </a:spcBef>
@@ -8875,11 +8982,11 @@
                 <a:ea typeface="Verdana" panose="020B0604030504040204" pitchFamily="34" charset="0"/>
                 <a:cs typeface="Baghdad" pitchFamily="2" charset="-78"/>
               </a:rPr>
-              <a:t>Note that the direction of bias is not captured by this measure. The magnitude of bias is arguably minor given the scale.</a:t>
+              <a:t>Note that the direction of bias is not captured by this measure. Further, the magnitude of bias is arguably minor given the scale.</a:t>
             </a:r>
           </a:p>
           <a:p>
-            <a:pPr lvl="4">
+            <a:pPr lvl="4" algn="just">
               <a:spcBef>
                 <a:spcPts val="600"/>
               </a:spcBef>
@@ -8894,7 +9001,7 @@
             </a:endParaRPr>
           </a:p>
           <a:p>
-            <a:pPr lvl="4">
+            <a:pPr lvl="4" algn="just">
               <a:spcBef>
                 <a:spcPts val="600"/>
               </a:spcBef>
@@ -8912,7 +9019,7 @@
             </a:r>
           </a:p>
           <a:p>
-            <a:pPr marL="571500" lvl="4" indent="-571500">
+            <a:pPr marL="571500" lvl="4" indent="-571500" algn="just">
               <a:spcBef>
                 <a:spcPts val="600"/>
               </a:spcBef>
@@ -8932,7 +9039,7 @@
             </a:r>
           </a:p>
           <a:p>
-            <a:pPr marL="571500" lvl="4" indent="-571500">
+            <a:pPr marL="571500" lvl="4" indent="-571500" algn="just">
               <a:spcBef>
                 <a:spcPts val="600"/>
               </a:spcBef>
@@ -8948,11 +9055,55 @@
                 <a:ea typeface="Verdana" panose="020B0604030504040204" pitchFamily="34" charset="0"/>
                 <a:cs typeface="Baghdad" pitchFamily="2" charset="-78"/>
               </a:rPr>
-              <a:t>The result might be surprising at first glance. However, the transparency report shows that the most influential features that led to this classification were age and priors count. </a:t>
+              <a:t>The result might be surprising at first glance. However, the transparency report shows that the most influential features that led to this classification were </a:t>
             </a:r>
-          </a:p>
-          <a:p>
-            <a:pPr marL="571500" lvl="4" indent="-571500">
+            <a:r>
+              <a:rPr lang="en-US" sz="4400" i="1" dirty="0">
+                <a:solidFill>
+                  <a:schemeClr val="tx1"/>
+                </a:solidFill>
+                <a:latin typeface="Avenir Roman" panose="02000503020000020003" pitchFamily="2" charset="0"/>
+                <a:ea typeface="Verdana" panose="020B0604030504040204" pitchFamily="34" charset="0"/>
+                <a:cs typeface="Baghdad" pitchFamily="2" charset="-78"/>
+              </a:rPr>
+              <a:t>Age</a:t>
+            </a:r>
+            <a:r>
+              <a:rPr lang="en-US" sz="4400" dirty="0">
+                <a:solidFill>
+                  <a:schemeClr val="tx1"/>
+                </a:solidFill>
+                <a:latin typeface="Avenir Roman" panose="02000503020000020003" pitchFamily="2" charset="0"/>
+                <a:ea typeface="Verdana" panose="020B0604030504040204" pitchFamily="34" charset="0"/>
+                <a:cs typeface="Baghdad" pitchFamily="2" charset="-78"/>
+              </a:rPr>
+              <a:t> and </a:t>
+            </a:r>
+            <a:r>
+              <a:rPr lang="en-US" sz="4400" i="1" dirty="0">
+                <a:solidFill>
+                  <a:schemeClr val="tx1"/>
+                </a:solidFill>
+                <a:latin typeface="Avenir Roman" panose="02000503020000020003" pitchFamily="2" charset="0"/>
+                <a:ea typeface="Verdana" panose="020B0604030504040204" pitchFamily="34" charset="0"/>
+                <a:cs typeface="Baghdad" pitchFamily="2" charset="-78"/>
+              </a:rPr>
+              <a:t>Priors Count</a:t>
+            </a:r>
+            <a:r>
+              <a:rPr lang="en-US" sz="4400" dirty="0">
+                <a:solidFill>
+                  <a:schemeClr val="tx1"/>
+                </a:solidFill>
+                <a:latin typeface="Avenir Roman" panose="02000503020000020003" pitchFamily="2" charset="0"/>
+                <a:ea typeface="Verdana" panose="020B0604030504040204" pitchFamily="34" charset="0"/>
+                <a:cs typeface="Baghdad" pitchFamily="2" charset="-78"/>
+              </a:rPr>
+              <a:t>. </a:t>
+            </a:r>
+          </a:p>
+          <a:p>
+            <a:pPr marL="571500" lvl="4" indent="-571500" algn="just">
               <a:spcBef>
                 <a:spcPts val="600"/>
               </a:spcBef>
@@ -8968,7 +9119,29 @@
                 <a:ea typeface="Verdana" panose="020B0604030504040204" pitchFamily="34" charset="0"/>
                 <a:cs typeface="Baghdad" pitchFamily="2" charset="-78"/>
               </a:rPr>
-              <a:t>This alerts us of the problematic behaviors of the underlying classifier, which heavily weights age. </a:t>
+              <a:t>This alerts us of the problematic behaviors of the underlying classifier, which heavily weights </a:t>
+            </a:r>
+            <a:r>
+              <a:rPr lang="en-US" sz="4400" i="1" dirty="0">
+                <a:solidFill>
+                  <a:schemeClr val="tx1"/>
+                </a:solidFill>
+                <a:latin typeface="Avenir Roman" panose="02000503020000020003" pitchFamily="2" charset="0"/>
+                <a:ea typeface="Verdana" panose="020B0604030504040204" pitchFamily="34" charset="0"/>
+                <a:cs typeface="Baghdad" pitchFamily="2" charset="-78"/>
+              </a:rPr>
+              <a:t>Age</a:t>
+            </a:r>
+            <a:r>
+              <a:rPr lang="en-US" sz="4400" dirty="0">
+                <a:solidFill>
+                  <a:schemeClr val="tx1"/>
+                </a:solidFill>
+                <a:latin typeface="Avenir Roman" panose="02000503020000020003" pitchFamily="2" charset="0"/>
+                <a:ea typeface="Verdana" panose="020B0604030504040204" pitchFamily="34" charset="0"/>
+                <a:cs typeface="Baghdad" pitchFamily="2" charset="-78"/>
+              </a:rPr>
+              <a:t>. </a:t>
             </a:r>
             <a:endParaRPr lang="en-US" sz="4400" b="1" dirty="0">
               <a:solidFill>
@@ -8980,7 +9153,7 @@
             </a:endParaRPr>
           </a:p>
           <a:p>
-            <a:pPr lvl="4">
+            <a:pPr lvl="4" algn="just">
               <a:spcBef>
                 <a:spcPts val="600"/>
               </a:spcBef>
@@ -9010,7 +9183,7 @@
         </p:nvSpPr>
         <p:spPr>
           <a:xfrm>
-            <a:off x="29313782" y="15051642"/>
+            <a:off x="29319338" y="15051642"/>
             <a:ext cx="13845581" cy="913287"/>
           </a:xfrm>
           <a:prstGeom prst="rect">
@@ -9066,7 +9239,7 @@
         </p:nvSpPr>
         <p:spPr>
           <a:xfrm>
-            <a:off x="720725" y="22127878"/>
+            <a:off x="720725" y="22195499"/>
             <a:ext cx="13856693" cy="10231077"/>
           </a:xfrm>
           <a:prstGeom prst="rect">
@@ -9084,7 +9257,7 @@
           </a:ln>
         </p:spPr>
         <p:txBody>
-          <a:bodyPr wrap="square" lIns="457200" tIns="274320" rIns="457200" bIns="274320" rtlCol="0">
+          <a:bodyPr wrap="square" lIns="411480" tIns="274320" rIns="411480" bIns="274320" rtlCol="0">
             <a:noAutofit/>
           </a:bodyPr>
           <a:lstStyle/>
@@ -9227,12 +9400,26 @@
           </a:ln>
         </p:spPr>
         <p:txBody>
-          <a:bodyPr wrap="square" lIns="457200" tIns="274320" rIns="457200" bIns="274320" rtlCol="0">
+          <a:bodyPr wrap="square" lIns="411480" tIns="274320" rIns="411480" bIns="274320" rtlCol="0">
             <a:noAutofit/>
           </a:bodyPr>
           <a:lstStyle/>
           <a:p>
-            <a:pPr marL="571500" indent="-571500">
+            <a:pPr marL="571500" indent="-571500" algn="just">
+              <a:spcBef>
+                <a:spcPts val="600"/>
+              </a:spcBef>
+              <a:buFont typeface="Arial" panose="020B0604020202020204" pitchFamily="34" charset="0"/>
+              <a:buChar char="•"/>
+            </a:pPr>
+            <a:endParaRPr lang="en-US" sz="2400" dirty="0">
+              <a:latin typeface="Avenir Roman" panose="02000503020000020003" pitchFamily="2" charset="0"/>
+              <a:ea typeface="Verdana" panose="020B0604030504040204" pitchFamily="34" charset="0"/>
+              <a:cs typeface="Baghdad" pitchFamily="2" charset="-78"/>
+            </a:endParaRPr>
+          </a:p>
+          <a:p>
+            <a:pPr marL="571500" indent="-571500" algn="just">
               <a:spcBef>
                 <a:spcPts val="600"/>
               </a:spcBef>
@@ -9249,7 +9436,7 @@
             </a:r>
           </a:p>
           <a:p>
-            <a:pPr marL="571500" lvl="0" indent="-571500">
+            <a:pPr marL="571500" lvl="0" indent="-571500" algn="just">
               <a:spcBef>
                 <a:spcPts val="600"/>
               </a:spcBef>
@@ -9266,7 +9453,33 @@
             </a:r>
           </a:p>
           <a:p>
-            <a:pPr marL="571500" lvl="0" indent="-571500">
+            <a:pPr marL="571500" lvl="0" indent="-571500" algn="just">
+              <a:spcBef>
+                <a:spcPts val="600"/>
+              </a:spcBef>
+              <a:buFont typeface="Arial" panose="020B0604020202020204" pitchFamily="34" charset="0"/>
+              <a:buChar char="•"/>
+            </a:pPr>
+            <a:endParaRPr lang="en-US" sz="4400" dirty="0">
+              <a:latin typeface="Avenir Roman" panose="02000503020000020003" pitchFamily="2" charset="0"/>
+              <a:ea typeface="Verdana" panose="020B0604030504040204" pitchFamily="34" charset="0"/>
+              <a:cs typeface="Baghdad" pitchFamily="2" charset="-78"/>
+            </a:endParaRPr>
+          </a:p>
+          <a:p>
+            <a:pPr lvl="0" algn="just">
+              <a:spcBef>
+                <a:spcPts val="600"/>
+              </a:spcBef>
+            </a:pPr>
+            <a:endParaRPr lang="en-US" sz="4400" dirty="0">
+              <a:latin typeface="Avenir Roman" panose="02000503020000020003" pitchFamily="2" charset="0"/>
+              <a:ea typeface="Verdana" panose="020B0604030504040204" pitchFamily="34" charset="0"/>
+              <a:cs typeface="Baghdad" pitchFamily="2" charset="-78"/>
+            </a:endParaRPr>
+          </a:p>
+          <a:p>
+            <a:pPr marL="571500" lvl="0" indent="-571500" algn="just">
               <a:spcBef>
                 <a:spcPts val="600"/>
               </a:spcBef>
@@ -9280,33 +9493,6 @@
                 <a:cs typeface="Baghdad" pitchFamily="2" charset="-78"/>
               </a:rPr>
               <a:t>One influence measure for marginal QII is the Shapley value. This metric is grounded in cooperative game theory.</a:t>
-            </a:r>
-          </a:p>
-          <a:p>
-            <a:pPr lvl="0">
-              <a:spcBef>
-                <a:spcPts val="600"/>
-              </a:spcBef>
-            </a:pPr>
-            <a:endParaRPr lang="en-US" sz="4400" dirty="0">
-              <a:latin typeface="Avenir Roman" panose="02000503020000020003" pitchFamily="2" charset="0"/>
-              <a:ea typeface="Verdana" panose="020B0604030504040204" pitchFamily="34" charset="0"/>
-              <a:cs typeface="Baghdad" pitchFamily="2" charset="-78"/>
-            </a:endParaRPr>
-          </a:p>
-          <a:p>
-            <a:pPr lvl="0">
-              <a:spcBef>
-                <a:spcPts val="600"/>
-              </a:spcBef>
-            </a:pPr>
-            <a:r>
-              <a:rPr lang="en-US" sz="4400" dirty="0">
-                <a:latin typeface="Avenir Roman" panose="02000503020000020003" pitchFamily="2" charset="0"/>
-                <a:ea typeface="Verdana" panose="020B0604030504040204" pitchFamily="34" charset="0"/>
-                <a:cs typeface="Baghdad" pitchFamily="2" charset="-78"/>
-              </a:rPr>
-              <a:t>p00ps</a:t>
             </a:r>
           </a:p>
         </p:txBody>
@@ -9382,14 +9568,14 @@
           <p:nvPr/>
         </p:nvPicPr>
         <p:blipFill rotWithShape="1">
-          <a:blip r:embed="rId5"/>
+          <a:blip r:embed="rId4"/>
           <a:srcRect t="5187" r="5437" b="57578"/>
           <a:stretch/>
         </p:blipFill>
         <p:spPr>
           <a:xfrm>
-            <a:off x="915075" y="26057761"/>
-            <a:ext cx="13479103" cy="1069084"/>
+            <a:off x="915075" y="26103481"/>
+            <a:ext cx="13479103" cy="1069085"/>
           </a:xfrm>
           <a:prstGeom prst="rect">
             <a:avLst/>
@@ -9411,7 +9597,7 @@
           <p:nvPr/>
         </p:nvPicPr>
         <p:blipFill rotWithShape="1">
-          <a:blip r:embed="rId5"/>
+          <a:blip r:embed="rId4"/>
           <a:srcRect l="21360" t="65141" r="29199" b="5204"/>
           <a:stretch/>
         </p:blipFill>
@@ -9487,7 +9673,7 @@
           <p:nvPr/>
         </p:nvPicPr>
         <p:blipFill>
-          <a:blip r:embed="rId6"/>
+          <a:blip r:embed="rId5"/>
           <a:stretch>
             <a:fillRect/>
           </a:stretch>
@@ -9912,7 +10098,7 @@
           <p:nvPr/>
         </p:nvPicPr>
         <p:blipFill rotWithShape="1">
-          <a:blip r:embed="rId7"/>
+          <a:blip r:embed="rId6"/>
           <a:srcRect t="8295" b="2602"/>
           <a:stretch/>
         </p:blipFill>
@@ -9941,7 +10127,7 @@
           <p:nvPr/>
         </p:nvPicPr>
         <p:blipFill rotWithShape="1">
-          <a:blip r:embed="rId8"/>
+          <a:blip r:embed="rId7"/>
           <a:srcRect t="10340"/>
           <a:stretch/>
         </p:blipFill>
@@ -10161,7 +10347,7 @@
         </p:nvSpPr>
         <p:spPr>
           <a:xfrm>
-            <a:off x="19300371" y="25961328"/>
+            <a:off x="19300371" y="25984380"/>
             <a:ext cx="6074229" cy="474443"/>
           </a:xfrm>
           <a:prstGeom prst="rect">
@@ -10199,6 +10385,35 @@
           </a:p>
         </p:txBody>
       </p:sp>
+      <p:pic>
+        <p:nvPicPr>
+          <p:cNvPr id="3" name="Picture 2">
+            <a:extLst>
+              <a:ext uri="{FF2B5EF4-FFF2-40B4-BE49-F238E27FC236}">
+                <a16:creationId xmlns:a16="http://schemas.microsoft.com/office/drawing/2014/main" id="{0B926953-3639-5343-A0F5-D4FE63FFA42C}"/>
+              </a:ext>
+            </a:extLst>
+          </p:cNvPr>
+          <p:cNvPicPr>
+            <a:picLocks noChangeAspect="1"/>
+          </p:cNvPicPr>
+          <p:nvPr/>
+        </p:nvPicPr>
+        <p:blipFill rotWithShape="1">
+          <a:blip r:embed="rId8"/>
+          <a:srcRect l="3468" t="14012" r="3442" b="20444"/>
+          <a:stretch/>
+        </p:blipFill>
+        <p:spPr>
+          <a:xfrm>
+            <a:off x="31186361" y="10639702"/>
+            <a:ext cx="10100422" cy="871140"/>
+          </a:xfrm>
+          <a:prstGeom prst="rect">
+            <a:avLst/>
+          </a:prstGeom>
+        </p:spPr>
+      </p:pic>
     </p:spTree>
   </p:cSld>
   <p:clrMapOvr>

</xml_diff>